<commit_message>
[MT] Chap3 - Cybersickness
</commit_message>
<xml_diff>
--- a/figures/ch1/harmonic_vs_morse_potential.pptx
+++ b/figures/ch1/harmonic_vs_morse_potential.pptx
@@ -288,7 +288,7 @@
           <a:p>
             <a:fld id="{911B603B-1E74-1540-B527-C3E67B5B43F8}" type="datetimeFigureOut">
               <a:rPr lang="en-US" smtClean="0"/>
-              <a:t>21/09/15</a:t>
+              <a:t>22/09/15</a:t>
             </a:fld>
             <a:endParaRPr lang="en-US"/>
           </a:p>
@@ -458,7 +458,7 @@
           <a:p>
             <a:fld id="{911B603B-1E74-1540-B527-C3E67B5B43F8}" type="datetimeFigureOut">
               <a:rPr lang="en-US" smtClean="0"/>
-              <a:t>21/09/15</a:t>
+              <a:t>22/09/15</a:t>
             </a:fld>
             <a:endParaRPr lang="en-US"/>
           </a:p>
@@ -638,7 +638,7 @@
           <a:p>
             <a:fld id="{911B603B-1E74-1540-B527-C3E67B5B43F8}" type="datetimeFigureOut">
               <a:rPr lang="en-US" smtClean="0"/>
-              <a:t>21/09/15</a:t>
+              <a:t>22/09/15</a:t>
             </a:fld>
             <a:endParaRPr lang="en-US"/>
           </a:p>
@@ -808,7 +808,7 @@
           <a:p>
             <a:fld id="{911B603B-1E74-1540-B527-C3E67B5B43F8}" type="datetimeFigureOut">
               <a:rPr lang="en-US" smtClean="0"/>
-              <a:t>21/09/15</a:t>
+              <a:t>22/09/15</a:t>
             </a:fld>
             <a:endParaRPr lang="en-US"/>
           </a:p>
@@ -1054,7 +1054,7 @@
           <a:p>
             <a:fld id="{911B603B-1E74-1540-B527-C3E67B5B43F8}" type="datetimeFigureOut">
               <a:rPr lang="en-US" smtClean="0"/>
-              <a:t>21/09/15</a:t>
+              <a:t>22/09/15</a:t>
             </a:fld>
             <a:endParaRPr lang="en-US"/>
           </a:p>
@@ -1342,7 +1342,7 @@
           <a:p>
             <a:fld id="{911B603B-1E74-1540-B527-C3E67B5B43F8}" type="datetimeFigureOut">
               <a:rPr lang="en-US" smtClean="0"/>
-              <a:t>21/09/15</a:t>
+              <a:t>22/09/15</a:t>
             </a:fld>
             <a:endParaRPr lang="en-US"/>
           </a:p>
@@ -1764,7 +1764,7 @@
           <a:p>
             <a:fld id="{911B603B-1E74-1540-B527-C3E67B5B43F8}" type="datetimeFigureOut">
               <a:rPr lang="en-US" smtClean="0"/>
-              <a:t>21/09/15</a:t>
+              <a:t>22/09/15</a:t>
             </a:fld>
             <a:endParaRPr lang="en-US"/>
           </a:p>
@@ -1882,7 +1882,7 @@
           <a:p>
             <a:fld id="{911B603B-1E74-1540-B527-C3E67B5B43F8}" type="datetimeFigureOut">
               <a:rPr lang="en-US" smtClean="0"/>
-              <a:t>21/09/15</a:t>
+              <a:t>22/09/15</a:t>
             </a:fld>
             <a:endParaRPr lang="en-US"/>
           </a:p>
@@ -1977,7 +1977,7 @@
           <a:p>
             <a:fld id="{911B603B-1E74-1540-B527-C3E67B5B43F8}" type="datetimeFigureOut">
               <a:rPr lang="en-US" smtClean="0"/>
-              <a:t>21/09/15</a:t>
+              <a:t>22/09/15</a:t>
             </a:fld>
             <a:endParaRPr lang="en-US"/>
           </a:p>
@@ -2254,7 +2254,7 @@
           <a:p>
             <a:fld id="{911B603B-1E74-1540-B527-C3E67B5B43F8}" type="datetimeFigureOut">
               <a:rPr lang="en-US" smtClean="0"/>
-              <a:t>21/09/15</a:t>
+              <a:t>22/09/15</a:t>
             </a:fld>
             <a:endParaRPr lang="en-US"/>
           </a:p>
@@ -2507,7 +2507,7 @@
           <a:p>
             <a:fld id="{911B603B-1E74-1540-B527-C3E67B5B43F8}" type="datetimeFigureOut">
               <a:rPr lang="en-US" smtClean="0"/>
-              <a:t>21/09/15</a:t>
+              <a:t>22/09/15</a:t>
             </a:fld>
             <a:endParaRPr lang="en-US"/>
           </a:p>
@@ -2720,7 +2720,7 @@
           <a:p>
             <a:fld id="{911B603B-1E74-1540-B527-C3E67B5B43F8}" type="datetimeFigureOut">
               <a:rPr lang="en-US" smtClean="0"/>
-              <a:t>21/09/15</a:t>
+              <a:t>22/09/15</a:t>
             </a:fld>
             <a:endParaRPr lang="en-US"/>
           </a:p>
@@ -3097,21 +3097,21 @@
       </p:grpSpPr>
       <p:grpSp>
         <p:nvGrpSpPr>
-          <p:cNvPr id="11" name="Group 10"/>
+          <p:cNvPr id="2" name="Group 1"/>
           <p:cNvGrpSpPr/>
           <p:nvPr/>
         </p:nvGrpSpPr>
         <p:grpSpPr>
           <a:xfrm>
             <a:off x="661608" y="0"/>
-            <a:ext cx="8937177" cy="6858000"/>
+            <a:ext cx="8482392" cy="6857999"/>
             <a:chOff x="661608" y="0"/>
-            <a:chExt cx="8937177" cy="6858000"/>
+            <a:chExt cx="8482392" cy="6857999"/>
           </a:xfrm>
         </p:grpSpPr>
         <p:pic>
           <p:nvPicPr>
-            <p:cNvPr id="5" name="Picture 4" descr="Morse-potential_edit.png"/>
+            <p:cNvPr id="5" name="Picture 4"/>
             <p:cNvPicPr>
               <a:picLocks noChangeAspect="1"/>
             </p:cNvPicPr>
@@ -3132,7 +3132,7 @@
           <p:spPr>
             <a:xfrm>
               <a:off x="850900" y="0"/>
-              <a:ext cx="7425124" cy="6858000"/>
+              <a:ext cx="7425124" cy="6857999"/>
             </a:xfrm>
             <a:prstGeom prst="rect">
               <a:avLst/>
@@ -3166,14 +3166,7 @@
                   <a:latin typeface="Times New Roman"/>
                   <a:cs typeface="Times New Roman"/>
                 </a:rPr>
-                <a:t>S</a:t>
-              </a:r>
-              <a:r>
-                <a:rPr lang="en-US" sz="3200" i="1" dirty="0" err="1" smtClean="0">
-                  <a:latin typeface="Times New Roman"/>
-                  <a:cs typeface="Times New Roman"/>
-                </a:rPr>
-                <a:t>éparation</a:t>
+                <a:t>Séparation</a:t>
               </a:r>
               <a:r>
                 <a:rPr lang="en-US" sz="3200" i="1" dirty="0" smtClean="0">
@@ -3264,6 +3257,16 @@
                 </a:rPr>
                 <a:t>Harmonique</a:t>
               </a:r>
+              <a:r>
+                <a:rPr lang="en-US" sz="2600" dirty="0" smtClean="0">
+                  <a:solidFill>
+                    <a:srgbClr val="00BB00"/>
+                  </a:solidFill>
+                  <a:latin typeface="Times New Roman"/>
+                  <a:cs typeface="Times New Roman"/>
+                </a:rPr>
+                <a:t>`</a:t>
+              </a:r>
               <a:endParaRPr lang="en-US" sz="2600" dirty="0">
                 <a:solidFill>
                   <a:srgbClr val="00BB00"/>
@@ -3324,8 +3327,8 @@
           </p:nvSpPr>
           <p:spPr>
             <a:xfrm>
-              <a:off x="5014687" y="928675"/>
-              <a:ext cx="4584098" cy="461665"/>
+              <a:off x="5075162" y="964603"/>
+              <a:ext cx="4068838" cy="461665"/>
             </a:xfrm>
             <a:prstGeom prst="rect">
               <a:avLst/>

</xml_diff>